<commit_message>
Working with Test Cases
</commit_message>
<xml_diff>
--- a/Slides/Blazor/6.Forms/FORMS.pptx
+++ b/Slides/Blazor/6.Forms/FORMS.pptx
@@ -5,7 +5,7 @@
     <p:sldMasterId id="2147483648" r:id="rId4"/>
   </p:sldMasterIdLst>
   <p:notesMasterIdLst>
-    <p:notesMasterId r:id="rId17"/>
+    <p:notesMasterId r:id="rId18"/>
   </p:notesMasterIdLst>
   <p:sldIdLst>
     <p:sldId id="257" r:id="rId5"/>
@@ -20,6 +20,7 @@
     <p:sldId id="363" r:id="rId14"/>
     <p:sldId id="365" r:id="rId15"/>
     <p:sldId id="364" r:id="rId16"/>
+    <p:sldId id="366" r:id="rId17"/>
   </p:sldIdLst>
   <p:sldSz cx="12192000" cy="6858000"/>
   <p:notesSz cx="6858000" cy="9144000"/>
@@ -208,7 +209,7 @@
           <a:p>
             <a:fld id="{EC850AC9-7C52-458A-B8C8-2FFB680727B2}" type="datetimeFigureOut">
               <a:rPr lang="en-US" smtClean="0"/>
-              <a:t>7/18/2023</a:t>
+              <a:t>7/19/2023</a:t>
             </a:fld>
             <a:endParaRPr lang="en-US"/>
           </a:p>
@@ -726,7 +727,7 @@
           <a:p>
             <a:fld id="{DDF9B122-9E82-4B94-A0F1-35F8DB588B66}" type="datetimeFigureOut">
               <a:rPr lang="en-US" smtClean="0"/>
-              <a:t>7/18/2023</a:t>
+              <a:t>7/19/2023</a:t>
             </a:fld>
             <a:endParaRPr lang="en-US"/>
           </a:p>
@@ -924,7 +925,7 @@
           <a:p>
             <a:fld id="{DDF9B122-9E82-4B94-A0F1-35F8DB588B66}" type="datetimeFigureOut">
               <a:rPr lang="en-US" smtClean="0"/>
-              <a:t>7/18/2023</a:t>
+              <a:t>7/19/2023</a:t>
             </a:fld>
             <a:endParaRPr lang="en-US"/>
           </a:p>
@@ -1132,7 +1133,7 @@
           <a:p>
             <a:fld id="{DDF9B122-9E82-4B94-A0F1-35F8DB588B66}" type="datetimeFigureOut">
               <a:rPr lang="en-US" smtClean="0"/>
-              <a:t>7/18/2023</a:t>
+              <a:t>7/19/2023</a:t>
             </a:fld>
             <a:endParaRPr lang="en-US"/>
           </a:p>
@@ -1999,7 +2000,7 @@
           <a:p>
             <a:fld id="{DDF9B122-9E82-4B94-A0F1-35F8DB588B66}" type="datetimeFigureOut">
               <a:rPr lang="en-US" smtClean="0"/>
-              <a:t>7/18/2023</a:t>
+              <a:t>7/19/2023</a:t>
             </a:fld>
             <a:endParaRPr lang="en-US"/>
           </a:p>
@@ -2274,7 +2275,7 @@
           <a:p>
             <a:fld id="{DDF9B122-9E82-4B94-A0F1-35F8DB588B66}" type="datetimeFigureOut">
               <a:rPr lang="en-US" smtClean="0"/>
-              <a:t>7/18/2023</a:t>
+              <a:t>7/19/2023</a:t>
             </a:fld>
             <a:endParaRPr lang="en-US"/>
           </a:p>
@@ -2539,7 +2540,7 @@
           <a:p>
             <a:fld id="{DDF9B122-9E82-4B94-A0F1-35F8DB588B66}" type="datetimeFigureOut">
               <a:rPr lang="en-US" smtClean="0"/>
-              <a:t>7/18/2023</a:t>
+              <a:t>7/19/2023</a:t>
             </a:fld>
             <a:endParaRPr lang="en-US"/>
           </a:p>
@@ -2951,7 +2952,7 @@
           <a:p>
             <a:fld id="{DDF9B122-9E82-4B94-A0F1-35F8DB588B66}" type="datetimeFigureOut">
               <a:rPr lang="en-US" smtClean="0"/>
-              <a:t>7/18/2023</a:t>
+              <a:t>7/19/2023</a:t>
             </a:fld>
             <a:endParaRPr lang="en-US"/>
           </a:p>
@@ -3092,7 +3093,7 @@
           <a:p>
             <a:fld id="{DDF9B122-9E82-4B94-A0F1-35F8DB588B66}" type="datetimeFigureOut">
               <a:rPr lang="en-US" smtClean="0"/>
-              <a:t>7/18/2023</a:t>
+              <a:t>7/19/2023</a:t>
             </a:fld>
             <a:endParaRPr lang="en-US"/>
           </a:p>
@@ -3205,7 +3206,7 @@
           <a:p>
             <a:fld id="{DDF9B122-9E82-4B94-A0F1-35F8DB588B66}" type="datetimeFigureOut">
               <a:rPr lang="en-US" smtClean="0"/>
-              <a:t>7/18/2023</a:t>
+              <a:t>7/19/2023</a:t>
             </a:fld>
             <a:endParaRPr lang="en-US"/>
           </a:p>
@@ -3516,7 +3517,7 @@
           <a:p>
             <a:fld id="{DDF9B122-9E82-4B94-A0F1-35F8DB588B66}" type="datetimeFigureOut">
               <a:rPr lang="en-US" smtClean="0"/>
-              <a:t>7/18/2023</a:t>
+              <a:t>7/19/2023</a:t>
             </a:fld>
             <a:endParaRPr lang="en-US"/>
           </a:p>
@@ -3804,7 +3805,7 @@
           <a:p>
             <a:fld id="{DDF9B122-9E82-4B94-A0F1-35F8DB588B66}" type="datetimeFigureOut">
               <a:rPr lang="en-US" smtClean="0"/>
-              <a:t>7/18/2023</a:t>
+              <a:t>7/19/2023</a:t>
             </a:fld>
             <a:endParaRPr lang="en-US"/>
           </a:p>
@@ -4045,7 +4046,7 @@
           <a:p>
             <a:fld id="{DDF9B122-9E82-4B94-A0F1-35F8DB588B66}" type="datetimeFigureOut">
               <a:rPr lang="en-US" smtClean="0"/>
-              <a:t>7/18/2023</a:t>
+              <a:t>7/19/2023</a:t>
             </a:fld>
             <a:endParaRPr lang="en-US"/>
           </a:p>
@@ -27231,15 +27232,7 @@
           <a:p>
             <a:r>
               <a:rPr lang="en-US" sz="2000" dirty="0"/>
-              <a:t>We need to tell </a:t>
-            </a:r>
-            <a:r>
-              <a:rPr lang="en-US" sz="2000" dirty="0" err="1"/>
-              <a:t>Blazor</a:t>
-            </a:r>
-            <a:r>
-              <a:rPr lang="en-US" sz="2000" dirty="0"/>
-              <a:t> how to understand and process them. To do this, we will install a package into the Client project, which is going to do all the heavy lifting for us. It’s called </a:t>
+              <a:t>We need to tell Blazor how to understand and process them. To do this, we will install a package into the Client project, which is going to do all the heavy lifting for us. It’s called </a:t>
             </a:r>
             <a:r>
               <a:rPr lang="en-US" sz="2000" dirty="0" err="1"/>
@@ -27271,15 +27264,7 @@
             </a:r>
             <a:r>
               <a:rPr lang="en-US" sz="2000" dirty="0"/>
-              <a:t>, which, when included in an </a:t>
-            </a:r>
-            <a:r>
-              <a:rPr lang="en-US" sz="2000" dirty="0" err="1"/>
-              <a:t>EditForm</a:t>
-            </a:r>
-            <a:r>
-              <a:rPr lang="en-US" sz="2000" dirty="0"/>
-              <a:t> component, will allow the form model to be validated according to any Fluent Validation rules. </a:t>
+              <a:t>, which, when included in an EditForm component, will allow the form model to be validated according to any Fluent Validation rules. </a:t>
             </a:r>
           </a:p>
           <a:p>
@@ -27328,15 +27313,7 @@
           <a:p>
             <a:r>
               <a:rPr lang="en-US" sz="2000" dirty="0"/>
-              <a:t>We are now ready to add the validation components to our form. The first thing we’ll do is tell the </a:t>
-            </a:r>
-            <a:r>
-              <a:rPr lang="en-US" sz="2000" dirty="0" err="1"/>
-              <a:t>EditForm</a:t>
-            </a:r>
-            <a:r>
-              <a:rPr lang="en-US" sz="2000" dirty="0"/>
-              <a:t> component that we want the model to be validated with Fluent Validation. To do this, we add the </a:t>
+              <a:t>We are now ready to add the validation components to our form. The first thing we’ll do is tell the EditForm component that we want the model to be validated with Fluent Validation. To do this, we add the </a:t>
             </a:r>
             <a:r>
               <a:rPr lang="en-US" sz="2000" dirty="0" err="1"/>
@@ -27344,23 +27321,7 @@
             </a:r>
             <a:r>
               <a:rPr lang="en-US" sz="2000" dirty="0"/>
-              <a:t> component somewhere between the opening and closing tags of the </a:t>
-            </a:r>
-            <a:r>
-              <a:rPr lang="en-US" sz="2000" dirty="0" err="1"/>
-              <a:t>EditForm</a:t>
-            </a:r>
-            <a:r>
-              <a:rPr lang="en-US" sz="2000" dirty="0"/>
-              <a:t>. I prefer to add it right at the top, directly under the opening </a:t>
-            </a:r>
-            <a:r>
-              <a:rPr lang="en-US" sz="2000" dirty="0" err="1"/>
-              <a:t>EditForm</a:t>
-            </a:r>
-            <a:r>
-              <a:rPr lang="en-US" sz="2000" dirty="0"/>
-              <a:t> tag.</a:t>
+              <a:t> component somewhere between the opening and closing tags of the EditForm. I prefer to add it right at the top, directly under the opening EditForm tag.</a:t>
             </a:r>
           </a:p>
         </p:txBody>
@@ -27662,15 +27623,7 @@
           <a:p>
             <a:r>
               <a:rPr lang="en-US" sz="2000" dirty="0"/>
-              <a:t>If we use the browser developer tools to inspect the HTML of the page, we can see another effect of validation. An invalid class is added by </a:t>
-            </a:r>
-            <a:r>
-              <a:rPr lang="en-US" sz="2000" dirty="0" err="1"/>
-              <a:t>Blazor’s</a:t>
-            </a:r>
-            <a:r>
-              <a:rPr lang="en-US" sz="2000" dirty="0"/>
-              <a:t> validation system  incase a input is invalid. To help toward accessibility, an aria attribute was also applied, aria-invalid.</a:t>
+              <a:t>If we use the browser developer tools to inspect the HTML of the page, we can see another effect of validation. An invalid class is added by Blazor’s validation system  incase a input is invalid. To help toward accessibility, an aria attribute was also applied, aria-invalid.</a:t>
             </a:r>
           </a:p>
           <a:p>
@@ -27681,12 +27634,8 @@
           </a:p>
           <a:p>
             <a:r>
-              <a:rPr lang="en-US" sz="2000" dirty="0" err="1"/>
-              <a:t>EditContext</a:t>
-            </a:r>
-            <a:r>
               <a:rPr lang="en-US" sz="2000" dirty="0"/>
-              <a:t> keeps track of the state of the form. It knows the state of each property on the model at any given time. When validation is executed, the input component bound to a property is updated with CSS classes that represent that property’s state. Those classes are:</a:t>
+              <a:t>EditContext keeps track of the state of the form. It knows the state of each property on the model at any given time. When validation is executed, the input component bound to a property is updated with CSS classes that represent that property’s state. Those classes are:</a:t>
             </a:r>
           </a:p>
           <a:p>
@@ -27773,6 +27722,146 @@
     <p:extLst>
       <p:ext uri="{BB962C8B-B14F-4D97-AF65-F5344CB8AC3E}">
         <p14:creationId xmlns:p14="http://schemas.microsoft.com/office/powerpoint/2010/main" val="4173558744"/>
+      </p:ext>
+    </p:extLst>
+  </p:cSld>
+  <p:clrMapOvr>
+    <a:masterClrMapping/>
+  </p:clrMapOvr>
+</p:sld>
+</file>
+
+<file path=ppt/slides/slide13.xml><?xml version="1.0" encoding="utf-8"?>
+<p:sld xmlns:a="http://schemas.openxmlformats.org/drawingml/2006/main" xmlns:r="http://schemas.openxmlformats.org/officeDocument/2006/relationships" xmlns:p="http://schemas.openxmlformats.org/presentationml/2006/main">
+  <p:cSld>
+    <p:spTree>
+      <p:nvGrpSpPr>
+        <p:cNvPr id="1" name=""/>
+        <p:cNvGrpSpPr/>
+        <p:nvPr/>
+      </p:nvGrpSpPr>
+      <p:grpSpPr>
+        <a:xfrm>
+          <a:off x="0" y="0"/>
+          <a:ext cx="0" cy="0"/>
+          <a:chOff x="0" y="0"/>
+          <a:chExt cx="0" cy="0"/>
+        </a:xfrm>
+      </p:grpSpPr>
+      <p:sp>
+        <p:nvSpPr>
+          <p:cNvPr id="2" name="Title 1">
+            <a:extLst>
+              <a:ext uri="{FF2B5EF4-FFF2-40B4-BE49-F238E27FC236}">
+                <a16:creationId xmlns:a16="http://schemas.microsoft.com/office/drawing/2014/main" id="{B20DC5CD-6CBA-DE2C-46BE-34C6C4E51F87}"/>
+              </a:ext>
+            </a:extLst>
+          </p:cNvPr>
+          <p:cNvSpPr>
+            <a:spLocks noGrp="1"/>
+          </p:cNvSpPr>
+          <p:nvPr>
+            <p:ph type="title"/>
+          </p:nvPr>
+        </p:nvSpPr>
+        <p:spPr>
+          <a:xfrm>
+            <a:off x="609600" y="62400"/>
+            <a:ext cx="7747000" cy="613400"/>
+          </a:xfrm>
+        </p:spPr>
+        <p:txBody>
+          <a:bodyPr/>
+          <a:lstStyle/>
+          <a:p>
+            <a:r>
+              <a:rPr lang="en-US" b="1" dirty="0"/>
+              <a:t>Summary </a:t>
+            </a:r>
+          </a:p>
+        </p:txBody>
+      </p:sp>
+      <p:sp>
+        <p:nvSpPr>
+          <p:cNvPr id="3" name="Text Placeholder 2">
+            <a:extLst>
+              <a:ext uri="{FF2B5EF4-FFF2-40B4-BE49-F238E27FC236}">
+                <a16:creationId xmlns:a16="http://schemas.microsoft.com/office/drawing/2014/main" id="{60AD1E62-31DC-E90E-2711-E38765C7A445}"/>
+              </a:ext>
+            </a:extLst>
+          </p:cNvPr>
+          <p:cNvSpPr>
+            <a:spLocks noGrp="1"/>
+          </p:cNvSpPr>
+          <p:nvPr>
+            <p:ph type="body" idx="1"/>
+          </p:nvPr>
+        </p:nvSpPr>
+        <p:spPr>
+          <a:xfrm>
+            <a:off x="541867" y="575733"/>
+            <a:ext cx="11370733" cy="6112933"/>
+          </a:xfrm>
+        </p:spPr>
+        <p:txBody>
+          <a:bodyPr/>
+          <a:lstStyle/>
+          <a:p>
+            <a:r>
+              <a:rPr lang="en-US" sz="2400" dirty="0"/>
+              <a:t>The primary advantage of using Blazor form components over traditional HTML forms is validation.</a:t>
+            </a:r>
+          </a:p>
+          <a:p>
+            <a:r>
+              <a:rPr lang="en-US" sz="2400" dirty="0"/>
+              <a:t> The EditForm component is a drop-in replacement for the HTML form element. Blazor ships with component versions of all the standard HTML input controls. </a:t>
+            </a:r>
+          </a:p>
+          <a:p>
+            <a:r>
+              <a:rPr lang="en-US" sz="2400" dirty="0"/>
+              <a:t>The EditForm requires a model that represents the data the form will collect, as well as a handler for one of the submit events it exposes (OnSubmit, On-</a:t>
+            </a:r>
+            <a:r>
+              <a:rPr lang="en-US" sz="2400" dirty="0" err="1"/>
+              <a:t>ValidSubmit</a:t>
+            </a:r>
+            <a:r>
+              <a:rPr lang="en-US" sz="2400" dirty="0"/>
+              <a:t>, OnInvalidSubmit).</a:t>
+            </a:r>
+          </a:p>
+          <a:p>
+            <a:r>
+              <a:rPr lang="en-US" sz="2400" dirty="0"/>
+              <a:t> Internally, the EditForm will construct an EditContext, which is the brain of the form and keeps track of the validation state of the model, as well as coordinates validation events. </a:t>
+            </a:r>
+          </a:p>
+          <a:p>
+            <a:r>
+              <a:rPr lang="en-US" sz="2400" dirty="0"/>
+              <a:t>To use Blazor’s input components, they must be bound to a property on the model passed to the EditContext. This is done using the @bind directive.</a:t>
+            </a:r>
+          </a:p>
+          <a:p>
+            <a:r>
+              <a:rPr lang="en-US" sz="2400" dirty="0"/>
+              <a:t> Blazor ships with a validation component called DataAnnotationsValidator, which enables the Data Annotations validation system to be used with models. </a:t>
+            </a:r>
+          </a:p>
+          <a:p>
+            <a:r>
+              <a:rPr lang="en-US" sz="2400" dirty="0"/>
+              <a:t>The validation system in Blazor is flexible and extendable, and other validation systems can easily be added by swapping out the validator component</a:t>
+            </a:r>
+          </a:p>
+        </p:txBody>
+      </p:sp>
+    </p:spTree>
+    <p:extLst>
+      <p:ext uri="{BB962C8B-B14F-4D97-AF65-F5344CB8AC3E}">
+        <p14:creationId xmlns:p14="http://schemas.microsoft.com/office/powerpoint/2010/main" val="4024103241"/>
       </p:ext>
     </p:extLst>
   </p:cSld>
@@ -27926,37 +28015,13 @@
           <a:p>
             <a:r>
               <a:rPr lang="en-US" sz="2000" dirty="0"/>
-              <a:t> We pass a model into the EditForm, which is an instance of a class that represents the data we want to collect with the form. Internally, the EditForm component constructs an </a:t>
-            </a:r>
-            <a:r>
-              <a:rPr lang="en-US" sz="2000" dirty="0" err="1"/>
-              <a:t>EditContext</a:t>
-            </a:r>
-            <a:r>
-              <a:rPr lang="en-US" sz="2000" dirty="0"/>
-              <a:t>—this is the brain of the form’s system. It keeps track of all the input components and the state of the model. Whenever a value is updated on the model, it will trigger validation via a validator component. Blazor ships with a validator component called </a:t>
-            </a:r>
-            <a:r>
-              <a:rPr lang="en-US" sz="2000" dirty="0" err="1"/>
-              <a:t>DataAnnotationsValidator</a:t>
-            </a:r>
-            <a:r>
-              <a:rPr lang="en-US" sz="2000" dirty="0"/>
-              <a:t>, which allows the validation of models using the Data Annotations. Different validator components can be used to support different validation systems—more on this later.</a:t>
+              <a:t> We pass a model into the EditForm, which is an instance of a class that represents the data we want to collect with the form. Internally, the EditForm component constructs an EditContext—this is the brain of the form’s system. It keeps track of all the input components and the state of the model. Whenever a value is updated on the model, it will trigger validation via a validator component. Blazor ships with a validator component called DataAnnotationsValidator, which allows the validation of models using the Data Annotations. Different validator components can be used to support different validation systems—more on this later.</a:t>
             </a:r>
           </a:p>
           <a:p>
             <a:r>
               <a:rPr lang="en-US" sz="2000" dirty="0"/>
-              <a:t> The EditForm offers three events for handling form submits. The </a:t>
-            </a:r>
-            <a:r>
-              <a:rPr lang="en-US" sz="2000" dirty="0" err="1"/>
-              <a:t>OnSubmit</a:t>
-            </a:r>
-            <a:r>
-              <a:rPr lang="en-US" sz="2000" dirty="0"/>
-              <a:t> event is the same as the standard submit event on an HTML form. It will be invoked whenever the Submit button is clicked, and the handler is responsible for making sure the model is valid. The </a:t>
+              <a:t> The EditForm offers three events for handling form submits. The OnSubmit event is the same as the standard submit event on an HTML form. It will be invoked whenever the Submit button is clicked, and the handler is responsible for making sure the model is valid. The </a:t>
             </a:r>
             <a:r>
               <a:rPr lang="en-US" sz="2000" dirty="0" err="1"/>
@@ -27964,23 +28029,7 @@
             </a:r>
             <a:r>
               <a:rPr lang="en-US" sz="2000" dirty="0"/>
-              <a:t> event is my personal favorite. This event is triggered when the Submit button is clicked but with a key difference: the EditForm will check with the </a:t>
-            </a:r>
-            <a:r>
-              <a:rPr lang="en-US" sz="2000" dirty="0" err="1"/>
-              <a:t>EditContext</a:t>
-            </a:r>
-            <a:r>
-              <a:rPr lang="en-US" sz="2000" dirty="0"/>
-              <a:t> first to make sure the model is valid. The handler will be called only when the model is valid. This makes writing the handler much simpler, as no validation code needs to be written. The final event is </a:t>
-            </a:r>
-            <a:r>
-              <a:rPr lang="en-US" sz="2000" dirty="0" err="1"/>
-              <a:t>OnInvalidSubmit</a:t>
-            </a:r>
-            <a:r>
-              <a:rPr lang="en-US" sz="2000" dirty="0"/>
-              <a:t>. As you can probably guess, this works in the opposite way to the </a:t>
+              <a:t> event is my personal favorite. This event is triggered when the Submit button is clicked but with a key difference: the EditForm will check with the EditContext first to make sure the model is valid. The handler will be called only when the model is valid. This makes writing the handler much simpler, as no validation code needs to be written. The final event is OnInvalidSubmit. As you can probably guess, this works in the opposite way to the </a:t>
             </a:r>
             <a:r>
               <a:rPr lang="en-US" sz="2000" dirty="0" err="1"/>
@@ -28572,18 +28621,10 @@
           <a:p>
             <a:r>
               <a:rPr lang="en-US" sz="2000" dirty="0"/>
-              <a:t>Validation is the most important part of building forms. Without validation, the system can end up containing all kinds of rubbish data. Out of the box, </a:t>
+              <a:t>Validation is the most important part of building forms. Without validation, the system can end up containing all kinds of rubbish data. Out of the box, Blazor includes a few components to help us do this .They are </a:t>
             </a:r>
             <a:r>
-              <a:rPr lang="en-US" sz="2000" dirty="0" err="1"/>
-              <a:t>Blazor</a:t>
-            </a:r>
-            <a:r>
-              <a:rPr lang="en-US" sz="2000" dirty="0"/>
-              <a:t> includes a few components to help us do this .They are </a:t>
-            </a:r>
-            <a:r>
-              <a:rPr lang="en-US" sz="2000" b="1" dirty="0" err="1"/>
+              <a:rPr lang="en-US" sz="2000" b="1" dirty="0"/>
               <a:t>DataAnnotationsValidator</a:t>
             </a:r>
             <a:r>
@@ -28609,20 +28650,12 @@
               <a:t> The </a:t>
             </a:r>
             <a:r>
-              <a:rPr lang="en-US" sz="2000" b="1" dirty="0" err="1"/>
+              <a:rPr lang="en-US" sz="2000" b="1" dirty="0"/>
               <a:t>DataAnnotationsValidator</a:t>
             </a:r>
             <a:r>
               <a:rPr lang="en-US" sz="2000" dirty="0"/>
-              <a:t> component allows </a:t>
-            </a:r>
-            <a:r>
-              <a:rPr lang="en-US" sz="2000" dirty="0" err="1"/>
-              <a:t>Blazor</a:t>
-            </a:r>
-            <a:r>
-              <a:rPr lang="en-US" sz="2000" dirty="0"/>
-              <a:t> forms to work with the Data Annotations validation system, which is the default for ASP.NET Core applications. This system works by decorating properties on a model with attributes that define the validation rules. For example, to make a text property required, we would do the following:</a:t>
+              <a:t> component allows Blazor forms to work with the Data Annotations validation system, which is the default for ASP.NET Core applications. This system works by decorating properties on a model with attributes that define the validation rules. For example, to make a text property required, we would do the following:</a:t>
             </a:r>
           </a:p>
           <a:p>

</xml_diff>